<commit_message>
updating with next week's materials
</commit_message>
<xml_diff>
--- a/04 - What is architecture.pptx
+++ b/04 - What is architecture.pptx
@@ -3536,7 +3536,7 @@
           <a:p>
             <a:fld id="{4735D8F5-352F-403D-80D0-F7F4EBDEAF57}" type="datetimeFigureOut">
               <a:rPr lang="en-US" smtClean="0"/>
-              <a:t>4/23/18</a:t>
+              <a:t>4/24/18</a:t>
             </a:fld>
             <a:endParaRPr lang="en-US"/>
           </a:p>
@@ -4051,7 +4051,7 @@
           <a:p>
             <a:fld id="{8700D84D-E6CA-412F-8495-61D0DB04649F}" type="datetimeFigureOut">
               <a:rPr lang="en-US" smtClean="0"/>
-              <a:t>4/23/18</a:t>
+              <a:t>4/24/18</a:t>
             </a:fld>
             <a:endParaRPr lang="en-US"/>
           </a:p>
@@ -4249,7 +4249,7 @@
           <a:p>
             <a:fld id="{8700D84D-E6CA-412F-8495-61D0DB04649F}" type="datetimeFigureOut">
               <a:rPr lang="en-US" smtClean="0"/>
-              <a:t>4/23/18</a:t>
+              <a:t>4/24/18</a:t>
             </a:fld>
             <a:endParaRPr lang="en-US"/>
           </a:p>
@@ -4457,7 +4457,7 @@
           <a:p>
             <a:fld id="{8700D84D-E6CA-412F-8495-61D0DB04649F}" type="datetimeFigureOut">
               <a:rPr lang="en-US" smtClean="0"/>
-              <a:t>4/23/18</a:t>
+              <a:t>4/24/18</a:t>
             </a:fld>
             <a:endParaRPr lang="en-US"/>
           </a:p>
@@ -4655,7 +4655,7 @@
           <a:p>
             <a:fld id="{8700D84D-E6CA-412F-8495-61D0DB04649F}" type="datetimeFigureOut">
               <a:rPr lang="en-US" smtClean="0"/>
-              <a:t>4/23/18</a:t>
+              <a:t>4/24/18</a:t>
             </a:fld>
             <a:endParaRPr lang="en-US"/>
           </a:p>
@@ -4930,7 +4930,7 @@
           <a:p>
             <a:fld id="{8700D84D-E6CA-412F-8495-61D0DB04649F}" type="datetimeFigureOut">
               <a:rPr lang="en-US" smtClean="0"/>
-              <a:t>4/23/18</a:t>
+              <a:t>4/24/18</a:t>
             </a:fld>
             <a:endParaRPr lang="en-US"/>
           </a:p>
@@ -5195,7 +5195,7 @@
           <a:p>
             <a:fld id="{8700D84D-E6CA-412F-8495-61D0DB04649F}" type="datetimeFigureOut">
               <a:rPr lang="en-US" smtClean="0"/>
-              <a:t>4/23/18</a:t>
+              <a:t>4/24/18</a:t>
             </a:fld>
             <a:endParaRPr lang="en-US"/>
           </a:p>
@@ -5607,7 +5607,7 @@
           <a:p>
             <a:fld id="{8700D84D-E6CA-412F-8495-61D0DB04649F}" type="datetimeFigureOut">
               <a:rPr lang="en-US" smtClean="0"/>
-              <a:t>4/23/18</a:t>
+              <a:t>4/24/18</a:t>
             </a:fld>
             <a:endParaRPr lang="en-US"/>
           </a:p>
@@ -5748,7 +5748,7 @@
           <a:p>
             <a:fld id="{8700D84D-E6CA-412F-8495-61D0DB04649F}" type="datetimeFigureOut">
               <a:rPr lang="en-US" smtClean="0"/>
-              <a:t>4/23/18</a:t>
+              <a:t>4/24/18</a:t>
             </a:fld>
             <a:endParaRPr lang="en-US"/>
           </a:p>
@@ -5861,7 +5861,7 @@
           <a:p>
             <a:fld id="{8700D84D-E6CA-412F-8495-61D0DB04649F}" type="datetimeFigureOut">
               <a:rPr lang="en-US" smtClean="0"/>
-              <a:t>4/23/18</a:t>
+              <a:t>4/24/18</a:t>
             </a:fld>
             <a:endParaRPr lang="en-US"/>
           </a:p>
@@ -6172,7 +6172,7 @@
           <a:p>
             <a:fld id="{8700D84D-E6CA-412F-8495-61D0DB04649F}" type="datetimeFigureOut">
               <a:rPr lang="en-US" smtClean="0"/>
-              <a:t>4/23/18</a:t>
+              <a:t>4/24/18</a:t>
             </a:fld>
             <a:endParaRPr lang="en-US"/>
           </a:p>
@@ -6460,7 +6460,7 @@
           <a:p>
             <a:fld id="{8700D84D-E6CA-412F-8495-61D0DB04649F}" type="datetimeFigureOut">
               <a:rPr lang="en-US" smtClean="0"/>
-              <a:t>4/23/18</a:t>
+              <a:t>4/24/18</a:t>
             </a:fld>
             <a:endParaRPr lang="en-US"/>
           </a:p>
@@ -6701,7 +6701,7 @@
           <a:p>
             <a:fld id="{8700D84D-E6CA-412F-8495-61D0DB04649F}" type="datetimeFigureOut">
               <a:rPr lang="en-US" smtClean="0"/>
-              <a:t>4/23/18</a:t>
+              <a:t>4/24/18</a:t>
             </a:fld>
             <a:endParaRPr lang="en-US"/>
           </a:p>
@@ -9730,7 +9730,64 @@
           <a:bodyPr/>
           <a:lstStyle/>
           <a:p>
-            <a:endParaRPr lang="en-US"/>
+            <a:pPr marL="0" indent="0">
+              <a:buNone/>
+            </a:pPr>
+            <a:r>
+              <a:rPr lang="en-US" dirty="0"/>
+              <a:t>Brooks chapters 19 and 20</a:t>
+            </a:r>
+          </a:p>
+          <a:p>
+            <a:pPr marL="457200" lvl="1" indent="0">
+              <a:buNone/>
+            </a:pPr>
+            <a:r>
+              <a:rPr lang="en-US" dirty="0"/>
+              <a:t>Read the materials</a:t>
+            </a:r>
+          </a:p>
+          <a:p>
+            <a:pPr marL="457200" lvl="1" indent="0">
+              <a:buNone/>
+            </a:pPr>
+            <a:r>
+              <a:rPr lang="en-US" dirty="0"/>
+              <a:t>Write a one-pager with your opinions</a:t>
+            </a:r>
+          </a:p>
+          <a:p>
+            <a:pPr marL="457200" lvl="1" indent="0">
+              <a:buNone/>
+            </a:pPr>
+            <a:r>
+              <a:rPr lang="en-US" dirty="0"/>
+              <a:t>Be prepared to talk about this</a:t>
+            </a:r>
+          </a:p>
+          <a:p>
+            <a:pPr marL="0" indent="0">
+              <a:buNone/>
+            </a:pPr>
+            <a:endParaRPr lang="en-US" dirty="0"/>
+          </a:p>
+          <a:p>
+            <a:pPr marL="0" indent="0">
+              <a:buNone/>
+            </a:pPr>
+            <a:r>
+              <a:rPr lang="en-US" sz="2400" b="1" dirty="0"/>
+              <a:t>19 - Great Designs Come from Great Designers</a:t>
+            </a:r>
+          </a:p>
+          <a:p>
+            <a:pPr marL="0" indent="0">
+              <a:buNone/>
+            </a:pPr>
+            <a:r>
+              <a:rPr lang="en-US" sz="2400" b="1" dirty="0"/>
+              <a:t>20 - Where Do Great Designers Come From?</a:t>
+            </a:r>
           </a:p>
         </p:txBody>
       </p:sp>

</xml_diff>